<commit_message>
Inserindo 2º mapa de empatia
</commit_message>
<xml_diff>
--- a/Documentação/Pesquisa de campo - Jornada do usuário.pptx
+++ b/Documentação/Pesquisa de campo - Jornada do usuário.pptx
@@ -8,7 +8,7 @@
     <p:sldMasterId id="2147483648" r:id="rId4"/>
   </p:sldMasterIdLst>
   <p:notesMasterIdLst>
-    <p:notesMasterId r:id="rId15"/>
+    <p:notesMasterId r:id="rId16"/>
   </p:notesMasterIdLst>
   <p:sldIdLst>
     <p:sldId id="256" r:id="rId5"/>
@@ -20,7 +20,8 @@
     <p:sldId id="274" r:id="rId11"/>
     <p:sldId id="275" r:id="rId12"/>
     <p:sldId id="272" r:id="rId13"/>
-    <p:sldId id="273" r:id="rId14"/>
+    <p:sldId id="278" r:id="rId14"/>
+    <p:sldId id="273" r:id="rId15"/>
   </p:sldIdLst>
   <p:sldSz cx="12192000" cy="6858000"/>
   <p:notesSz cx="6858000" cy="9144000"/>
@@ -127,6 +128,14 @@
 </p:presentation>
 </file>
 
+<file path=ppt/revisionInfo.xml><?xml version="1.0" encoding="utf-8"?>
+<p1510:revInfo xmlns:a="http://schemas.openxmlformats.org/drawingml/2006/main" xmlns:r="http://schemas.openxmlformats.org/officeDocument/2006/relationships" xmlns:p1510="http://schemas.microsoft.com/office/powerpoint/2015/10/main">
+  <p1510:revLst>
+    <p1510:client id="{9EC386E7-E5B1-1EC8-00F4-A82ACD458AA9}" v="85" dt="2021-03-02T22:52:53.990"/>
+  </p1510:revLst>
+</p1510:revInfo>
+</file>
+
 <file path=ppt/notesMasters/notesMaster1.xml><?xml version="1.0" encoding="utf-8"?>
 <p:notesMaster xmlns:a="http://schemas.openxmlformats.org/drawingml/2006/main" xmlns:r="http://schemas.openxmlformats.org/officeDocument/2006/relationships" xmlns:p="http://schemas.openxmlformats.org/presentationml/2006/main">
   <p:cSld>
@@ -209,7 +218,7 @@
           <a:p>
             <a:fld id="{4AD53522-E487-40CB-ACB4-8237639163A1}" type="datetimeFigureOut">
               <a:rPr lang="pt-BR" smtClean="0"/>
-              <a:t>01/03/2021</a:t>
+              <a:t>02/03/2021</a:t>
             </a:fld>
             <a:endParaRPr lang="pt-BR"/>
           </a:p>
@@ -367,7 +376,7 @@
           <a:p>
             <a:fld id="{3AD44842-7C85-48DF-909A-32ECC608DC49}" type="slidenum">
               <a:rPr lang="pt-BR" smtClean="0"/>
-              <a:t>‹nº›</a:t>
+              <a:t>‹#›</a:t>
             </a:fld>
             <a:endParaRPr lang="pt-BR"/>
           </a:p>
@@ -708,7 +717,7 @@
           <a:p>
             <a:fld id="{6F3F43C4-E6BB-4326-9F90-078C2AE021A7}" type="datetimeFigureOut">
               <a:rPr lang="pt-BR" smtClean="0"/>
-              <a:t>01/03/2021</a:t>
+              <a:t>02/03/2021</a:t>
             </a:fld>
             <a:endParaRPr lang="pt-BR"/>
           </a:p>
@@ -762,7 +771,7 @@
           <a:p>
             <a:fld id="{7EF2FC6F-08F2-4DA3-A765-78F474F37042}" type="slidenum">
               <a:rPr lang="pt-BR" smtClean="0"/>
-              <a:t>‹nº›</a:t>
+              <a:t>‹#›</a:t>
             </a:fld>
             <a:endParaRPr lang="pt-BR"/>
           </a:p>
@@ -906,7 +915,7 @@
           <a:p>
             <a:fld id="{6F3F43C4-E6BB-4326-9F90-078C2AE021A7}" type="datetimeFigureOut">
               <a:rPr lang="pt-BR" smtClean="0"/>
-              <a:t>01/03/2021</a:t>
+              <a:t>02/03/2021</a:t>
             </a:fld>
             <a:endParaRPr lang="pt-BR"/>
           </a:p>
@@ -960,7 +969,7 @@
           <a:p>
             <a:fld id="{7EF2FC6F-08F2-4DA3-A765-78F474F37042}" type="slidenum">
               <a:rPr lang="pt-BR" smtClean="0"/>
-              <a:t>‹nº›</a:t>
+              <a:t>‹#›</a:t>
             </a:fld>
             <a:endParaRPr lang="pt-BR"/>
           </a:p>
@@ -1114,7 +1123,7 @@
           <a:p>
             <a:fld id="{6F3F43C4-E6BB-4326-9F90-078C2AE021A7}" type="datetimeFigureOut">
               <a:rPr lang="pt-BR" smtClean="0"/>
-              <a:t>01/03/2021</a:t>
+              <a:t>02/03/2021</a:t>
             </a:fld>
             <a:endParaRPr lang="pt-BR"/>
           </a:p>
@@ -1168,7 +1177,7 @@
           <a:p>
             <a:fld id="{7EF2FC6F-08F2-4DA3-A765-78F474F37042}" type="slidenum">
               <a:rPr lang="pt-BR" smtClean="0"/>
-              <a:t>‹nº›</a:t>
+              <a:t>‹#›</a:t>
             </a:fld>
             <a:endParaRPr lang="pt-BR"/>
           </a:p>
@@ -1634,7 +1643,7 @@
               <a:pPr>
                 <a:defRPr/>
               </a:pPr>
-              <a:t>‹nº›</a:t>
+              <a:t>‹#›</a:t>
             </a:fld>
             <a:endParaRPr lang="pt-BR" sz="798"/>
           </a:p>
@@ -2329,7 +2338,7 @@
           <a:p>
             <a:fld id="{75EA822D-EC7F-445D-B4B2-1D8BFE09073C}" type="datetimeFigureOut">
               <a:rPr lang="pt-BR" smtClean="0"/>
-              <a:t>01/03/2021</a:t>
+              <a:t>02/03/2021</a:t>
             </a:fld>
             <a:endParaRPr lang="pt-BR"/>
           </a:p>
@@ -2383,7 +2392,7 @@
           <a:p>
             <a:fld id="{F262BED7-5D49-4284-ABDB-4B6CE40C2609}" type="slidenum">
               <a:rPr lang="pt-BR" smtClean="0"/>
-              <a:t>‹nº›</a:t>
+              <a:t>‹#›</a:t>
             </a:fld>
             <a:endParaRPr lang="pt-BR"/>
           </a:p>
@@ -2437,7 +2446,7 @@
             <a:fld id="{1D8BD707-D9CF-40AE-B4C6-C98DA3205C09}" type="datetimeFigureOut">
               <a:rPr lang="en-US" smtClean="0"/>
               <a:pPr/>
-              <a:t>3/1/2021</a:t>
+              <a:t>3/2/2021</a:t>
             </a:fld>
             <a:endParaRPr lang="en-US"/>
           </a:p>
@@ -2480,7 +2489,7 @@
             <a:fld id="{B6F15528-21DE-4FAA-801E-634DDDAF4B2B}" type="slidenum">
               <a:rPr lang="en-US" smtClean="0"/>
               <a:pPr/>
-              <a:t>‹nº›</a:t>
+              <a:t>‹#›</a:t>
             </a:fld>
             <a:endParaRPr lang="en-US"/>
           </a:p>
@@ -2619,7 +2628,7 @@
           <a:p>
             <a:fld id="{6F3F43C4-E6BB-4326-9F90-078C2AE021A7}" type="datetimeFigureOut">
               <a:rPr lang="pt-BR" smtClean="0"/>
-              <a:t>01/03/2021</a:t>
+              <a:t>02/03/2021</a:t>
             </a:fld>
             <a:endParaRPr lang="pt-BR"/>
           </a:p>
@@ -2673,7 +2682,7 @@
           <a:p>
             <a:fld id="{7EF2FC6F-08F2-4DA3-A765-78F474F37042}" type="slidenum">
               <a:rPr lang="pt-BR" smtClean="0"/>
-              <a:t>‹nº›</a:t>
+              <a:t>‹#›</a:t>
             </a:fld>
             <a:endParaRPr lang="pt-BR"/>
           </a:p>
@@ -2894,7 +2903,7 @@
           <a:p>
             <a:fld id="{6F3F43C4-E6BB-4326-9F90-078C2AE021A7}" type="datetimeFigureOut">
               <a:rPr lang="pt-BR" smtClean="0"/>
-              <a:t>01/03/2021</a:t>
+              <a:t>02/03/2021</a:t>
             </a:fld>
             <a:endParaRPr lang="pt-BR"/>
           </a:p>
@@ -2948,7 +2957,7 @@
           <a:p>
             <a:fld id="{7EF2FC6F-08F2-4DA3-A765-78F474F37042}" type="slidenum">
               <a:rPr lang="pt-BR" smtClean="0"/>
-              <a:t>‹nº›</a:t>
+              <a:t>‹#›</a:t>
             </a:fld>
             <a:endParaRPr lang="pt-BR"/>
           </a:p>
@@ -3159,7 +3168,7 @@
           <a:p>
             <a:fld id="{6F3F43C4-E6BB-4326-9F90-078C2AE021A7}" type="datetimeFigureOut">
               <a:rPr lang="pt-BR" smtClean="0"/>
-              <a:t>01/03/2021</a:t>
+              <a:t>02/03/2021</a:t>
             </a:fld>
             <a:endParaRPr lang="pt-BR"/>
           </a:p>
@@ -3213,7 +3222,7 @@
           <a:p>
             <a:fld id="{7EF2FC6F-08F2-4DA3-A765-78F474F37042}" type="slidenum">
               <a:rPr lang="pt-BR" smtClean="0"/>
-              <a:t>‹nº›</a:t>
+              <a:t>‹#›</a:t>
             </a:fld>
             <a:endParaRPr lang="pt-BR"/>
           </a:p>
@@ -3571,7 +3580,7 @@
           <a:p>
             <a:fld id="{6F3F43C4-E6BB-4326-9F90-078C2AE021A7}" type="datetimeFigureOut">
               <a:rPr lang="pt-BR" smtClean="0"/>
-              <a:t>01/03/2021</a:t>
+              <a:t>02/03/2021</a:t>
             </a:fld>
             <a:endParaRPr lang="pt-BR"/>
           </a:p>
@@ -3625,7 +3634,7 @@
           <a:p>
             <a:fld id="{7EF2FC6F-08F2-4DA3-A765-78F474F37042}" type="slidenum">
               <a:rPr lang="pt-BR" smtClean="0"/>
-              <a:t>‹nº›</a:t>
+              <a:t>‹#›</a:t>
             </a:fld>
             <a:endParaRPr lang="pt-BR"/>
           </a:p>
@@ -3712,7 +3721,7 @@
           <a:p>
             <a:fld id="{6F3F43C4-E6BB-4326-9F90-078C2AE021A7}" type="datetimeFigureOut">
               <a:rPr lang="pt-BR" smtClean="0"/>
-              <a:t>01/03/2021</a:t>
+              <a:t>02/03/2021</a:t>
             </a:fld>
             <a:endParaRPr lang="pt-BR"/>
           </a:p>
@@ -3766,7 +3775,7 @@
           <a:p>
             <a:fld id="{7EF2FC6F-08F2-4DA3-A765-78F474F37042}" type="slidenum">
               <a:rPr lang="pt-BR" smtClean="0"/>
-              <a:t>‹nº›</a:t>
+              <a:t>‹#›</a:t>
             </a:fld>
             <a:endParaRPr lang="pt-BR"/>
           </a:p>
@@ -3825,7 +3834,7 @@
           <a:p>
             <a:fld id="{6F3F43C4-E6BB-4326-9F90-078C2AE021A7}" type="datetimeFigureOut">
               <a:rPr lang="pt-BR" smtClean="0"/>
-              <a:t>01/03/2021</a:t>
+              <a:t>02/03/2021</a:t>
             </a:fld>
             <a:endParaRPr lang="pt-BR"/>
           </a:p>
@@ -3879,7 +3888,7 @@
           <a:p>
             <a:fld id="{7EF2FC6F-08F2-4DA3-A765-78F474F37042}" type="slidenum">
               <a:rPr lang="pt-BR" smtClean="0"/>
-              <a:t>‹nº›</a:t>
+              <a:t>‹#›</a:t>
             </a:fld>
             <a:endParaRPr lang="pt-BR"/>
           </a:p>
@@ -4136,7 +4145,7 @@
           <a:p>
             <a:fld id="{6F3F43C4-E6BB-4326-9F90-078C2AE021A7}" type="datetimeFigureOut">
               <a:rPr lang="pt-BR" smtClean="0"/>
-              <a:t>01/03/2021</a:t>
+              <a:t>02/03/2021</a:t>
             </a:fld>
             <a:endParaRPr lang="pt-BR"/>
           </a:p>
@@ -4190,7 +4199,7 @@
           <a:p>
             <a:fld id="{7EF2FC6F-08F2-4DA3-A765-78F474F37042}" type="slidenum">
               <a:rPr lang="pt-BR" smtClean="0"/>
-              <a:t>‹nº›</a:t>
+              <a:t>‹#›</a:t>
             </a:fld>
             <a:endParaRPr lang="pt-BR"/>
           </a:p>
@@ -4424,7 +4433,7 @@
           <a:p>
             <a:fld id="{6F3F43C4-E6BB-4326-9F90-078C2AE021A7}" type="datetimeFigureOut">
               <a:rPr lang="pt-BR" smtClean="0"/>
-              <a:t>01/03/2021</a:t>
+              <a:t>02/03/2021</a:t>
             </a:fld>
             <a:endParaRPr lang="pt-BR"/>
           </a:p>
@@ -4478,7 +4487,7 @@
           <a:p>
             <a:fld id="{7EF2FC6F-08F2-4DA3-A765-78F474F37042}" type="slidenum">
               <a:rPr lang="pt-BR" smtClean="0"/>
-              <a:t>‹nº›</a:t>
+              <a:t>‹#›</a:t>
             </a:fld>
             <a:endParaRPr lang="pt-BR"/>
           </a:p>
@@ -4665,7 +4674,7 @@
           <a:p>
             <a:fld id="{6F3F43C4-E6BB-4326-9F90-078C2AE021A7}" type="datetimeFigureOut">
               <a:rPr lang="pt-BR" smtClean="0"/>
-              <a:t>01/03/2021</a:t>
+              <a:t>02/03/2021</a:t>
             </a:fld>
             <a:endParaRPr lang="pt-BR"/>
           </a:p>
@@ -4755,7 +4764,7 @@
           <a:p>
             <a:fld id="{7EF2FC6F-08F2-4DA3-A765-78F474F37042}" type="slidenum">
               <a:rPr lang="pt-BR" smtClean="0"/>
-              <a:t>‹nº›</a:t>
+              <a:t>‹#›</a:t>
             </a:fld>
             <a:endParaRPr lang="pt-BR"/>
           </a:p>
@@ -5514,7 +5523,7 @@
           <a:p>
             <a:fld id="{75EA822D-EC7F-445D-B4B2-1D8BFE09073C}" type="datetimeFigureOut">
               <a:rPr lang="pt-BR" smtClean="0"/>
-              <a:t>01/03/2021</a:t>
+              <a:t>02/03/2021</a:t>
             </a:fld>
             <a:endParaRPr lang="pt-BR"/>
           </a:p>
@@ -5604,7 +5613,7 @@
           <a:p>
             <a:fld id="{F262BED7-5D49-4284-ABDB-4B6CE40C2609}" type="slidenum">
               <a:rPr lang="pt-BR" smtClean="0"/>
-              <a:t>‹nº›</a:t>
+              <a:t>‹#›</a:t>
             </a:fld>
             <a:endParaRPr lang="pt-BR"/>
           </a:p>
@@ -6055,7 +6064,7 @@
             <a:fld id="{1D8BD707-D9CF-40AE-B4C6-C98DA3205C09}" type="datetimeFigureOut">
               <a:rPr lang="en-US" smtClean="0"/>
               <a:pPr/>
-              <a:t>3/1/2021</a:t>
+              <a:t>3/2/2021</a:t>
             </a:fld>
             <a:endParaRPr lang="en-US"/>
           </a:p>
@@ -6134,7 +6143,7 @@
             <a:fld id="{B6F15528-21DE-4FAA-801E-634DDDAF4B2B}" type="slidenum">
               <a:rPr lang="en-US" smtClean="0"/>
               <a:pPr/>
-              <a:t>‹nº›</a:t>
+              <a:t>‹#›</a:t>
             </a:fld>
             <a:endParaRPr lang="en-US"/>
           </a:p>
@@ -6506,6 +6515,66 @@
           <a:chExt cx="0" cy="0"/>
         </a:xfrm>
       </p:grpSpPr>
+      <p:pic>
+        <p:nvPicPr>
+          <p:cNvPr id="3" name="Picture 3">
+            <a:extLst>
+              <a:ext uri="{FF2B5EF4-FFF2-40B4-BE49-F238E27FC236}">
+                <a16:creationId xmlns:a16="http://schemas.microsoft.com/office/drawing/2014/main" id="{5FBEA0F3-3E7E-4C19-A4F0-181E88F73211}"/>
+              </a:ext>
+            </a:extLst>
+          </p:cNvPr>
+          <p:cNvPicPr>
+            <a:picLocks noChangeAspect="1"/>
+          </p:cNvPicPr>
+          <p:nvPr/>
+        </p:nvPicPr>
+        <p:blipFill>
+          <a:blip r:embed="rId2"/>
+          <a:stretch>
+            <a:fillRect/>
+          </a:stretch>
+        </p:blipFill>
+        <p:spPr>
+          <a:xfrm>
+            <a:off x="878681" y="75752"/>
+            <a:ext cx="10434636" cy="6706495"/>
+          </a:xfrm>
+          <a:prstGeom prst="rect">
+            <a:avLst/>
+          </a:prstGeom>
+        </p:spPr>
+      </p:pic>
+    </p:spTree>
+    <p:extLst>
+      <p:ext uri="{BB962C8B-B14F-4D97-AF65-F5344CB8AC3E}">
+        <p14:creationId xmlns:p14="http://schemas.microsoft.com/office/powerpoint/2010/main" val="2398784963"/>
+      </p:ext>
+    </p:extLst>
+  </p:cSld>
+  <p:clrMapOvr>
+    <a:masterClrMapping/>
+  </p:clrMapOvr>
+</p:sld>
+</file>
+
+<file path=ppt/slides/slide11.xml><?xml version="1.0" encoding="utf-8"?>
+<p:sld xmlns:a="http://schemas.openxmlformats.org/drawingml/2006/main" xmlns:r="http://schemas.openxmlformats.org/officeDocument/2006/relationships" xmlns:p="http://schemas.openxmlformats.org/presentationml/2006/main">
+  <p:cSld>
+    <p:spTree>
+      <p:nvGrpSpPr>
+        <p:cNvPr id="1" name=""/>
+        <p:cNvGrpSpPr/>
+        <p:nvPr/>
+      </p:nvGrpSpPr>
+      <p:grpSpPr>
+        <a:xfrm>
+          <a:off x="0" y="0"/>
+          <a:ext cx="0" cy="0"/>
+          <a:chOff x="0" y="0"/>
+          <a:chExt cx="0" cy="0"/>
+        </a:xfrm>
+      </p:grpSpPr>
       <p:sp>
         <p:nvSpPr>
           <p:cNvPr id="3" name="Espaço Reservado para Número de Slide 2"/>
@@ -6628,7 +6697,7 @@
               <a:pPr>
                 <a:defRPr/>
               </a:pPr>
-              <a:t>10</a:t>
+              <a:t>11</a:t>
             </a:fld>
             <a:endParaRPr lang="pt-BR" sz="798" dirty="0"/>
           </a:p>

</xml_diff>

<commit_message>
att diagrama de classes
</commit_message>
<xml_diff>
--- a/Documentação/Pesquisa de campo - Jornada do usuário.pptx
+++ b/Documentação/Pesquisa de campo - Jornada do usuário.pptx
@@ -376,7 +376,7 @@
           <a:p>
             <a:fld id="{3AD44842-7C85-48DF-909A-32ECC608DC49}" type="slidenum">
               <a:rPr lang="pt-BR" smtClean="0"/>
-              <a:t>‹#›</a:t>
+              <a:t>‹nº›</a:t>
             </a:fld>
             <a:endParaRPr lang="pt-BR"/>
           </a:p>
@@ -551,7 +551,7 @@
             <a:fld id="{75B3645A-D0AE-4F6E-A17E-E0036A9041AF}" type="slidenum">
               <a:rPr lang="pt-BR" smtClean="0"/>
               <a:pPr/>
-              <a:t>10</a:t>
+              <a:t>11</a:t>
             </a:fld>
             <a:endParaRPr lang="pt-BR"/>
           </a:p>
@@ -771,7 +771,7 @@
           <a:p>
             <a:fld id="{7EF2FC6F-08F2-4DA3-A765-78F474F37042}" type="slidenum">
               <a:rPr lang="pt-BR" smtClean="0"/>
-              <a:t>‹#›</a:t>
+              <a:t>‹nº›</a:t>
             </a:fld>
             <a:endParaRPr lang="pt-BR"/>
           </a:p>
@@ -969,7 +969,7 @@
           <a:p>
             <a:fld id="{7EF2FC6F-08F2-4DA3-A765-78F474F37042}" type="slidenum">
               <a:rPr lang="pt-BR" smtClean="0"/>
-              <a:t>‹#›</a:t>
+              <a:t>‹nº›</a:t>
             </a:fld>
             <a:endParaRPr lang="pt-BR"/>
           </a:p>
@@ -1177,7 +1177,7 @@
           <a:p>
             <a:fld id="{7EF2FC6F-08F2-4DA3-A765-78F474F37042}" type="slidenum">
               <a:rPr lang="pt-BR" smtClean="0"/>
-              <a:t>‹#›</a:t>
+              <a:t>‹nº›</a:t>
             </a:fld>
             <a:endParaRPr lang="pt-BR"/>
           </a:p>
@@ -1643,7 +1643,7 @@
               <a:pPr>
                 <a:defRPr/>
               </a:pPr>
-              <a:t>‹#›</a:t>
+              <a:t>‹nº›</a:t>
             </a:fld>
             <a:endParaRPr lang="pt-BR" sz="798"/>
           </a:p>
@@ -2392,7 +2392,7 @@
           <a:p>
             <a:fld id="{F262BED7-5D49-4284-ABDB-4B6CE40C2609}" type="slidenum">
               <a:rPr lang="pt-BR" smtClean="0"/>
-              <a:t>‹#›</a:t>
+              <a:t>‹nº›</a:t>
             </a:fld>
             <a:endParaRPr lang="pt-BR"/>
           </a:p>
@@ -2489,7 +2489,7 @@
             <a:fld id="{B6F15528-21DE-4FAA-801E-634DDDAF4B2B}" type="slidenum">
               <a:rPr lang="en-US" smtClean="0"/>
               <a:pPr/>
-              <a:t>‹#›</a:t>
+              <a:t>‹nº›</a:t>
             </a:fld>
             <a:endParaRPr lang="en-US"/>
           </a:p>
@@ -2682,7 +2682,7 @@
           <a:p>
             <a:fld id="{7EF2FC6F-08F2-4DA3-A765-78F474F37042}" type="slidenum">
               <a:rPr lang="pt-BR" smtClean="0"/>
-              <a:t>‹#›</a:t>
+              <a:t>‹nº›</a:t>
             </a:fld>
             <a:endParaRPr lang="pt-BR"/>
           </a:p>
@@ -2957,7 +2957,7 @@
           <a:p>
             <a:fld id="{7EF2FC6F-08F2-4DA3-A765-78F474F37042}" type="slidenum">
               <a:rPr lang="pt-BR" smtClean="0"/>
-              <a:t>‹#›</a:t>
+              <a:t>‹nº›</a:t>
             </a:fld>
             <a:endParaRPr lang="pt-BR"/>
           </a:p>
@@ -3222,7 +3222,7 @@
           <a:p>
             <a:fld id="{7EF2FC6F-08F2-4DA3-A765-78F474F37042}" type="slidenum">
               <a:rPr lang="pt-BR" smtClean="0"/>
-              <a:t>‹#›</a:t>
+              <a:t>‹nº›</a:t>
             </a:fld>
             <a:endParaRPr lang="pt-BR"/>
           </a:p>
@@ -3634,7 +3634,7 @@
           <a:p>
             <a:fld id="{7EF2FC6F-08F2-4DA3-A765-78F474F37042}" type="slidenum">
               <a:rPr lang="pt-BR" smtClean="0"/>
-              <a:t>‹#›</a:t>
+              <a:t>‹nº›</a:t>
             </a:fld>
             <a:endParaRPr lang="pt-BR"/>
           </a:p>
@@ -3775,7 +3775,7 @@
           <a:p>
             <a:fld id="{7EF2FC6F-08F2-4DA3-A765-78F474F37042}" type="slidenum">
               <a:rPr lang="pt-BR" smtClean="0"/>
-              <a:t>‹#›</a:t>
+              <a:t>‹nº›</a:t>
             </a:fld>
             <a:endParaRPr lang="pt-BR"/>
           </a:p>
@@ -3888,7 +3888,7 @@
           <a:p>
             <a:fld id="{7EF2FC6F-08F2-4DA3-A765-78F474F37042}" type="slidenum">
               <a:rPr lang="pt-BR" smtClean="0"/>
-              <a:t>‹#›</a:t>
+              <a:t>‹nº›</a:t>
             </a:fld>
             <a:endParaRPr lang="pt-BR"/>
           </a:p>
@@ -4199,7 +4199,7 @@
           <a:p>
             <a:fld id="{7EF2FC6F-08F2-4DA3-A765-78F474F37042}" type="slidenum">
               <a:rPr lang="pt-BR" smtClean="0"/>
-              <a:t>‹#›</a:t>
+              <a:t>‹nº›</a:t>
             </a:fld>
             <a:endParaRPr lang="pt-BR"/>
           </a:p>
@@ -4487,7 +4487,7 @@
           <a:p>
             <a:fld id="{7EF2FC6F-08F2-4DA3-A765-78F474F37042}" type="slidenum">
               <a:rPr lang="pt-BR" smtClean="0"/>
-              <a:t>‹#›</a:t>
+              <a:t>‹nº›</a:t>
             </a:fld>
             <a:endParaRPr lang="pt-BR"/>
           </a:p>
@@ -4764,7 +4764,7 @@
           <a:p>
             <a:fld id="{7EF2FC6F-08F2-4DA3-A765-78F474F37042}" type="slidenum">
               <a:rPr lang="pt-BR" smtClean="0"/>
-              <a:t>‹#›</a:t>
+              <a:t>‹nº›</a:t>
             </a:fld>
             <a:endParaRPr lang="pt-BR"/>
           </a:p>
@@ -5613,7 +5613,7 @@
           <a:p>
             <a:fld id="{F262BED7-5D49-4284-ABDB-4B6CE40C2609}" type="slidenum">
               <a:rPr lang="pt-BR" smtClean="0"/>
-              <a:t>‹#›</a:t>
+              <a:t>‹nº›</a:t>
             </a:fld>
             <a:endParaRPr lang="pt-BR"/>
           </a:p>
@@ -6143,7 +6143,7 @@
             <a:fld id="{B6F15528-21DE-4FAA-801E-634DDDAF4B2B}" type="slidenum">
               <a:rPr lang="en-US" smtClean="0"/>
               <a:pPr/>
-              <a:t>‹#›</a:t>
+              <a:t>‹nº›</a:t>
             </a:fld>
             <a:endParaRPr lang="en-US"/>
           </a:p>
@@ -11413,6 +11413,162 @@
           </a:p>
         </p:txBody>
       </p:sp>
+      <p:pic>
+        <p:nvPicPr>
+          <p:cNvPr id="5" name="Gráfico 4" descr="Smartphone com preenchimento sólido">
+            <a:extLst>
+              <a:ext uri="{FF2B5EF4-FFF2-40B4-BE49-F238E27FC236}">
+                <a16:creationId xmlns:a16="http://schemas.microsoft.com/office/drawing/2014/main" id="{5074A1F4-1F34-4504-93A3-9762DEDF4596}"/>
+              </a:ext>
+            </a:extLst>
+          </p:cNvPr>
+          <p:cNvPicPr>
+            <a:picLocks noChangeAspect="1"/>
+          </p:cNvPicPr>
+          <p:nvPr/>
+        </p:nvPicPr>
+        <p:blipFill>
+          <a:blip r:embed="rId23">
+            <a:extLst>
+              <a:ext uri="{28A0092B-C50C-407E-A947-70E740481C1C}">
+                <a14:useLocalDpi xmlns:a14="http://schemas.microsoft.com/office/drawing/2010/main" val="0"/>
+              </a:ext>
+              <a:ext uri="{96DAC541-7B7A-43D3-8B79-37D633B846F1}">
+                <asvg:svgBlip xmlns:asvg="http://schemas.microsoft.com/office/drawing/2016/SVG/main" r:embed="rId24"/>
+              </a:ext>
+            </a:extLst>
+          </a:blip>
+          <a:stretch>
+            <a:fillRect/>
+          </a:stretch>
+        </p:blipFill>
+        <p:spPr>
+          <a:xfrm>
+            <a:off x="2989066" y="4810189"/>
+            <a:ext cx="725089" cy="725089"/>
+          </a:xfrm>
+          <a:prstGeom prst="rect">
+            <a:avLst/>
+          </a:prstGeom>
+        </p:spPr>
+      </p:pic>
+      <p:pic>
+        <p:nvPicPr>
+          <p:cNvPr id="53" name="Gráfico 52" descr="Smartphone com preenchimento sólido">
+            <a:extLst>
+              <a:ext uri="{FF2B5EF4-FFF2-40B4-BE49-F238E27FC236}">
+                <a16:creationId xmlns:a16="http://schemas.microsoft.com/office/drawing/2014/main" id="{66C16F00-2216-4539-AF3F-3F0F6633E564}"/>
+              </a:ext>
+            </a:extLst>
+          </p:cNvPr>
+          <p:cNvPicPr>
+            <a:picLocks noChangeAspect="1"/>
+          </p:cNvPicPr>
+          <p:nvPr/>
+        </p:nvPicPr>
+        <p:blipFill>
+          <a:blip r:embed="rId23">
+            <a:extLst>
+              <a:ext uri="{28A0092B-C50C-407E-A947-70E740481C1C}">
+                <a14:useLocalDpi xmlns:a14="http://schemas.microsoft.com/office/drawing/2010/main" val="0"/>
+              </a:ext>
+              <a:ext uri="{96DAC541-7B7A-43D3-8B79-37D633B846F1}">
+                <asvg:svgBlip xmlns:asvg="http://schemas.microsoft.com/office/drawing/2016/SVG/main" r:embed="rId24"/>
+              </a:ext>
+            </a:extLst>
+          </a:blip>
+          <a:stretch>
+            <a:fillRect/>
+          </a:stretch>
+        </p:blipFill>
+        <p:spPr>
+          <a:xfrm>
+            <a:off x="5294510" y="4810602"/>
+            <a:ext cx="725089" cy="725089"/>
+          </a:xfrm>
+          <a:prstGeom prst="rect">
+            <a:avLst/>
+          </a:prstGeom>
+        </p:spPr>
+      </p:pic>
+      <p:pic>
+        <p:nvPicPr>
+          <p:cNvPr id="55" name="Gráfico 54" descr="Smartphone com preenchimento sólido">
+            <a:extLst>
+              <a:ext uri="{FF2B5EF4-FFF2-40B4-BE49-F238E27FC236}">
+                <a16:creationId xmlns:a16="http://schemas.microsoft.com/office/drawing/2014/main" id="{69DE26ED-11A5-44F9-A203-A004DAA36CC5}"/>
+              </a:ext>
+            </a:extLst>
+          </p:cNvPr>
+          <p:cNvPicPr>
+            <a:picLocks noChangeAspect="1"/>
+          </p:cNvPicPr>
+          <p:nvPr/>
+        </p:nvPicPr>
+        <p:blipFill>
+          <a:blip r:embed="rId23">
+            <a:extLst>
+              <a:ext uri="{28A0092B-C50C-407E-A947-70E740481C1C}">
+                <a14:useLocalDpi xmlns:a14="http://schemas.microsoft.com/office/drawing/2010/main" val="0"/>
+              </a:ext>
+              <a:ext uri="{96DAC541-7B7A-43D3-8B79-37D633B846F1}">
+                <asvg:svgBlip xmlns:asvg="http://schemas.microsoft.com/office/drawing/2016/SVG/main" r:embed="rId24"/>
+              </a:ext>
+            </a:extLst>
+          </a:blip>
+          <a:stretch>
+            <a:fillRect/>
+          </a:stretch>
+        </p:blipFill>
+        <p:spPr>
+          <a:xfrm>
+            <a:off x="7774494" y="4810602"/>
+            <a:ext cx="725089" cy="725089"/>
+          </a:xfrm>
+          <a:prstGeom prst="rect">
+            <a:avLst/>
+          </a:prstGeom>
+        </p:spPr>
+      </p:pic>
+      <p:pic>
+        <p:nvPicPr>
+          <p:cNvPr id="57" name="Gráfico 56" descr="Smartphone com preenchimento sólido">
+            <a:extLst>
+              <a:ext uri="{FF2B5EF4-FFF2-40B4-BE49-F238E27FC236}">
+                <a16:creationId xmlns:a16="http://schemas.microsoft.com/office/drawing/2014/main" id="{7583B767-2502-4C3C-8101-64DE13BCA411}"/>
+              </a:ext>
+            </a:extLst>
+          </p:cNvPr>
+          <p:cNvPicPr>
+            <a:picLocks noChangeAspect="1"/>
+          </p:cNvPicPr>
+          <p:nvPr/>
+        </p:nvPicPr>
+        <p:blipFill>
+          <a:blip r:embed="rId23">
+            <a:extLst>
+              <a:ext uri="{28A0092B-C50C-407E-A947-70E740481C1C}">
+                <a14:useLocalDpi xmlns:a14="http://schemas.microsoft.com/office/drawing/2010/main" val="0"/>
+              </a:ext>
+              <a:ext uri="{96DAC541-7B7A-43D3-8B79-37D633B846F1}">
+                <asvg:svgBlip xmlns:asvg="http://schemas.microsoft.com/office/drawing/2016/SVG/main" r:embed="rId24"/>
+              </a:ext>
+            </a:extLst>
+          </a:blip>
+          <a:stretch>
+            <a:fillRect/>
+          </a:stretch>
+        </p:blipFill>
+        <p:spPr>
+          <a:xfrm>
+            <a:off x="10058034" y="4810189"/>
+            <a:ext cx="725089" cy="725089"/>
+          </a:xfrm>
+          <a:prstGeom prst="rect">
+            <a:avLst/>
+          </a:prstGeom>
+        </p:spPr>
+      </p:pic>
     </p:spTree>
     <p:extLst>
       <p:ext uri="{BB962C8B-B14F-4D97-AF65-F5344CB8AC3E}">

</xml_diff>